<commit_message>
auto generate sample data, pattern
</commit_message>
<xml_diff>
--- a/Report/STRING MATCHING ALGORITHMS.pptx
+++ b/Report/STRING MATCHING ALGORITHMS.pptx
@@ -9530,7 +9530,7 @@
           </a:br>
           <a:r>
             <a:rPr lang="en-US"/>
-            <a:t>So khớp: O(nm)</a:t>
+            <a:t>So khớp: O(m+n) hoặc O(nm)</a:t>
           </a:r>
         </a:p>
       </dgm:t>
@@ -14184,7 +14184,7 @@
           </a:br>
           <a:r>
             <a:rPr lang="en-US" sz="2100" kern="1200"/>
-            <a:t>So khớp: O(nm)</a:t>
+            <a:t>So khớp: O(m+n) hoặc O(nm)</a:t>
           </a:r>
         </a:p>
       </dsp:txBody>
@@ -25696,7 +25696,7 @@
           <a:p>
             <a:fld id="{AF869721-F543-4A6C-BF9D-65D7CC540427}" type="datetimeFigureOut">
               <a:rPr lang="en-US" smtClean="0"/>
-              <a:t>11/19/2022</a:t>
+              <a:t>20-Nov-22</a:t>
             </a:fld>
             <a:endParaRPr lang="en-US" dirty="0"/>
           </a:p>
@@ -25873,7 +25873,7 @@
           <a:p>
             <a:fld id="{C732326A-4C88-4AFB-AA5B-5919D81DFF5B}" type="datetimeFigureOut">
               <a:rPr lang="en-US" smtClean="0"/>
-              <a:t>11/19/2022</a:t>
+              <a:t>20-Nov-22</a:t>
             </a:fld>
             <a:endParaRPr lang="en-US" dirty="0"/>
           </a:p>
@@ -26553,7 +26553,7 @@
           <a:p>
             <a:fld id="{BAE4CEAC-9896-4035-8B51-1185B86FD0E2}" type="datetime1">
               <a:rPr lang="en-US" smtClean="0"/>
-              <a:t>11/19/2022</a:t>
+              <a:t>20-Nov-22</a:t>
             </a:fld>
             <a:endParaRPr lang="en-US" dirty="0"/>
           </a:p>
@@ -26820,7 +26820,7 @@
           <a:p>
             <a:fld id="{1FBD167B-2D2F-406E-9C09-82FBE163B775}" type="datetime1">
               <a:rPr lang="en-US" smtClean="0"/>
-              <a:t>11/19/2022</a:t>
+              <a:t>20-Nov-22</a:t>
             </a:fld>
             <a:endParaRPr lang="en-US" dirty="0"/>
           </a:p>
@@ -27060,7 +27060,7 @@
           <a:p>
             <a:fld id="{1434342F-A38A-4ADB-84E7-C56D6B790914}" type="datetime1">
               <a:rPr lang="en-US" smtClean="0"/>
-              <a:t>11/19/2022</a:t>
+              <a:t>20-Nov-22</a:t>
             </a:fld>
             <a:endParaRPr lang="en-US" dirty="0"/>
           </a:p>
@@ -27305,7 +27305,7 @@
           <a:p>
             <a:fld id="{87965DCA-7F19-49C2-BAE6-B07FBF4EF9D6}" type="datetime1">
               <a:rPr lang="en-US" smtClean="0"/>
-              <a:t>11/19/2022</a:t>
+              <a:t>20-Nov-22</a:t>
             </a:fld>
             <a:endParaRPr lang="en-US" dirty="0"/>
           </a:p>
@@ -27617,7 +27617,7 @@
           <a:p>
             <a:fld id="{235D81B6-D8D8-4840-B570-DFCCF0E5D50B}" type="datetime1">
               <a:rPr lang="en-US" smtClean="0"/>
-              <a:t>11/19/2022</a:t>
+              <a:t>20-Nov-22</a:t>
             </a:fld>
             <a:endParaRPr lang="en-US" dirty="0"/>
           </a:p>
@@ -27924,7 +27924,7 @@
           <a:p>
             <a:fld id="{17C6A5CF-1E00-4C4B-AEDE-FB94EE0B082B}" type="datetime1">
               <a:rPr lang="en-US" smtClean="0"/>
-              <a:t>11/19/2022</a:t>
+              <a:t>20-Nov-22</a:t>
             </a:fld>
             <a:endParaRPr lang="en-US" dirty="0"/>
           </a:p>
@@ -28351,7 +28351,7 @@
           <a:p>
             <a:fld id="{47FDAFF6-0E59-4443-AC44-9AC0F916B9EC}" type="datetime1">
               <a:rPr lang="en-US" smtClean="0"/>
-              <a:t>11/19/2022</a:t>
+              <a:t>20-Nov-22</a:t>
             </a:fld>
             <a:endParaRPr lang="en-US" dirty="0"/>
           </a:p>
@@ -28451,7 +28451,7 @@
           <a:p>
             <a:fld id="{1172A8B7-A654-4C92-B44B-7F96C5D78FDD}" type="datetime1">
               <a:rPr lang="en-US" smtClean="0"/>
-              <a:t>11/19/2022</a:t>
+              <a:t>20-Nov-22</a:t>
             </a:fld>
             <a:endParaRPr lang="en-US" dirty="0"/>
           </a:p>
@@ -28618,7 +28618,7 @@
           <a:p>
             <a:fld id="{654810DD-FAC4-43CA-95AF-F403784CAFDE}" type="datetime1">
               <a:rPr lang="en-US" smtClean="0"/>
-              <a:t>11/19/2022</a:t>
+              <a:t>20-Nov-22</a:t>
             </a:fld>
             <a:endParaRPr lang="en-US" dirty="0"/>
           </a:p>
@@ -29001,7 +29001,7 @@
           <a:p>
             <a:fld id="{51E7C6A1-2743-46F3-BE4C-C425AE27F155}" type="datetime1">
               <a:rPr lang="en-US" smtClean="0"/>
-              <a:t>11/19/2022</a:t>
+              <a:t>20-Nov-22</a:t>
             </a:fld>
             <a:endParaRPr lang="en-US" dirty="0"/>
           </a:p>
@@ -29295,7 +29295,7 @@
           <a:p>
             <a:fld id="{075E006F-1D04-42D4-8BCA-B2F33FBA3EA5}" type="datetime1">
               <a:rPr lang="en-US" smtClean="0"/>
-              <a:t>11/19/2022</a:t>
+              <a:t>20-Nov-22</a:t>
             </a:fld>
             <a:endParaRPr lang="en-US" dirty="0"/>
           </a:p>
@@ -29511,7 +29511,7 @@
           <a:p>
             <a:fld id="{64E5A62D-BEE1-4886-810A-4511349E7079}" type="datetime1">
               <a:rPr lang="en-US" smtClean="0"/>
-              <a:t>11/19/2022</a:t>
+              <a:t>20-Nov-22</a:t>
             </a:fld>
             <a:endParaRPr lang="en-US" dirty="0"/>
           </a:p>
@@ -30640,7 +30640,7 @@
                   <a:schemeClr val="bg1"/>
                 </a:solidFill>
               </a:rPr>
-              <a:t>Nguyễn Thị Phương Thảo</a:t>
+              <a:t>Cao Thị Phương Thảo</a:t>
             </a:r>
           </a:p>
           <a:p>
@@ -32620,7 +32620,7 @@
             <p:ph idx="1"/>
             <p:extLst>
               <p:ext uri="{D42A27DB-BD31-4B8C-83A1-F6EECF244321}">
-                <p14:modId xmlns:p14="http://schemas.microsoft.com/office/powerpoint/2010/main" val="2164931404"/>
+                <p14:modId xmlns:p14="http://schemas.microsoft.com/office/powerpoint/2010/main" val="1608949840"/>
               </p:ext>
             </p:extLst>
           </p:nvPr>

</xml_diff>